<commit_message>
updated document CPCDS document docwnloads
</commit_message>
<xml_diff>
--- a/fsh/ig-data/input/images/CARINforBlueButtonProfileComparisonOverview.pptx
+++ b/fsh/ig-data/input/images/CARINforBlueButtonProfileComparisonOverview.pptx
@@ -2,16 +2,16 @@
 <file path=ppt/presentation.xml><?xml version="1.0" encoding="utf-8"?>
 <p:presentation xmlns:a="http://schemas.openxmlformats.org/drawingml/2006/main" xmlns:r="http://schemas.openxmlformats.org/officeDocument/2006/relationships" xmlns:p="http://schemas.openxmlformats.org/presentationml/2006/main" saveSubsetFonts="1" autoCompressPictures="0">
   <p:sldMasterIdLst>
-    <p:sldMasterId id="2147483648" r:id="rId1"/>
+    <p:sldMasterId id="2147483648" r:id="rId4"/>
   </p:sldMasterIdLst>
   <p:notesMasterIdLst>
-    <p:notesMasterId r:id="rId3"/>
+    <p:notesMasterId r:id="rId6"/>
   </p:notesMasterIdLst>
   <p:handoutMasterIdLst>
-    <p:handoutMasterId r:id="rId4"/>
+    <p:handoutMasterId r:id="rId7"/>
   </p:handoutMasterIdLst>
   <p:sldIdLst>
-    <p:sldId id="265" r:id="rId2"/>
+    <p:sldId id="2724" r:id="rId5"/>
   </p:sldIdLst>
   <p:sldSz cx="9144000" cy="5143500" type="screen16x9"/>
   <p:notesSz cx="6858000" cy="9144000"/>
@@ -264,7 +264,7 @@
             <a:fld id="{1BCE7D1B-E2D6-42EC-A46F-6B8D8AB722EA}" type="datetime1">
               <a:rPr lang="en-US" altLang="en-US"/>
               <a:pPr/>
-              <a:t>10/19/20</a:t>
+              <a:t>10/28/20</a:t>
             </a:fld>
             <a:endParaRPr lang="en-US" altLang="en-US"/>
           </a:p>
@@ -495,7 +495,7 @@
             <a:fld id="{60D4D74E-7671-46E5-9A5B-14F31A4C0D2E}" type="datetime1">
               <a:rPr lang="en-US" altLang="en-US"/>
               <a:pPr/>
-              <a:t>10/19/20</a:t>
+              <a:t>10/28/20</a:t>
             </a:fld>
             <a:endParaRPr lang="en-US" altLang="en-US"/>
           </a:p>
@@ -1325,7 +1325,7 @@
           <a:p>
             <a:fld id="{23F303CC-BC6F-44EE-9A09-81F690F71D2E}" type="datetime1">
               <a:rPr lang="en-US" altLang="en-US" smtClean="0"/>
-              <a:t>10/19/20</a:t>
+              <a:t>10/28/20</a:t>
             </a:fld>
             <a:endParaRPr lang="en-US" altLang="en-US" dirty="0"/>
           </a:p>
@@ -1898,6 +1898,53 @@
           <a:prstGeom prst="rect">
             <a:avLst/>
           </a:prstGeom>
+        </p:spPr>
+      </p:pic>
+      <p:pic>
+        <p:nvPicPr>
+          <p:cNvPr id="12" name="Picture 2" descr="FHIR Accelerator badge">
+            <a:extLst>
+              <a:ext uri="{FF2B5EF4-FFF2-40B4-BE49-F238E27FC236}">
+                <a16:creationId xmlns:a16="http://schemas.microsoft.com/office/drawing/2014/main" id="{D894C441-9702-450C-8C71-2C9A607146D8}"/>
+              </a:ext>
+            </a:extLst>
+          </p:cNvPr>
+          <p:cNvPicPr>
+            <a:picLocks noChangeAspect="1" noChangeArrowheads="1"/>
+          </p:cNvPicPr>
+          <p:nvPr userDrawn="1"/>
+        </p:nvPicPr>
+        <p:blipFill>
+          <a:blip r:embed="rId4" cstate="print">
+            <a:extLst>
+              <a:ext uri="{28A0092B-C50C-407E-A947-70E740481C1C}">
+                <a14:useLocalDpi xmlns:a14="http://schemas.microsoft.com/office/drawing/2010/main" val="0"/>
+              </a:ext>
+            </a:extLst>
+          </a:blip>
+          <a:srcRect/>
+          <a:stretch>
+            <a:fillRect/>
+          </a:stretch>
+        </p:blipFill>
+        <p:spPr bwMode="auto">
+          <a:xfrm>
+            <a:off x="9591892" y="63285"/>
+            <a:ext cx="798699" cy="798699"/>
+          </a:xfrm>
+          <a:prstGeom prst="rect">
+            <a:avLst/>
+          </a:prstGeom>
+          <a:noFill/>
+          <a:extLst>
+            <a:ext uri="{909E8E84-426E-40DD-AFC4-6F175D3DCCD1}">
+              <a14:hiddenFill xmlns:a14="http://schemas.microsoft.com/office/drawing/2010/main">
+                <a:solidFill>
+                  <a:srgbClr val="FFFFFF"/>
+                </a:solidFill>
+              </a14:hiddenFill>
+            </a:ext>
+          </a:extLst>
         </p:spPr>
       </p:pic>
     </p:spTree>
@@ -3875,6 +3922,53 @@
           </a:prstGeom>
         </p:spPr>
       </p:pic>
+      <p:pic>
+        <p:nvPicPr>
+          <p:cNvPr id="12" name="Picture 2" descr="FHIR Accelerator badge">
+            <a:extLst>
+              <a:ext uri="{FF2B5EF4-FFF2-40B4-BE49-F238E27FC236}">
+                <a16:creationId xmlns:a16="http://schemas.microsoft.com/office/drawing/2014/main" id="{90B851D3-21F9-467B-9DDA-AF8A80AA7BBB}"/>
+              </a:ext>
+            </a:extLst>
+          </p:cNvPr>
+          <p:cNvPicPr>
+            <a:picLocks noChangeAspect="1" noChangeArrowheads="1"/>
+          </p:cNvPicPr>
+          <p:nvPr userDrawn="1"/>
+        </p:nvPicPr>
+        <p:blipFill>
+          <a:blip r:embed="rId4" cstate="print">
+            <a:extLst>
+              <a:ext uri="{28A0092B-C50C-407E-A947-70E740481C1C}">
+                <a14:useLocalDpi xmlns:a14="http://schemas.microsoft.com/office/drawing/2010/main" val="0"/>
+              </a:ext>
+            </a:extLst>
+          </a:blip>
+          <a:srcRect/>
+          <a:stretch>
+            <a:fillRect/>
+          </a:stretch>
+        </p:blipFill>
+        <p:spPr bwMode="auto">
+          <a:xfrm>
+            <a:off x="8287450" y="43323"/>
+            <a:ext cx="798699" cy="798699"/>
+          </a:xfrm>
+          <a:prstGeom prst="rect">
+            <a:avLst/>
+          </a:prstGeom>
+          <a:noFill/>
+          <a:extLst>
+            <a:ext uri="{909E8E84-426E-40DD-AFC4-6F175D3DCCD1}">
+              <a14:hiddenFill xmlns:a14="http://schemas.microsoft.com/office/drawing/2010/main">
+                <a:solidFill>
+                  <a:srgbClr val="FFFFFF"/>
+                </a:solidFill>
+              </a14:hiddenFill>
+            </a:ext>
+          </a:extLst>
+        </p:spPr>
+      </p:pic>
     </p:spTree>
     <p:extLst>
       <p:ext uri="{BB962C8B-B14F-4D97-AF65-F5344CB8AC3E}">
@@ -6035,7 +6129,7 @@
           <a:p>
             <a:fld id="{7CE3BD8C-C39F-4FFF-9CD5-05E4806DBFF3}" type="datetime1">
               <a:rPr lang="en-US" altLang="en-US" smtClean="0"/>
-              <a:t>10/19/20</a:t>
+              <a:t>10/28/20</a:t>
             </a:fld>
             <a:endParaRPr lang="en-US" altLang="en-US"/>
           </a:p>
@@ -6564,57 +6658,10 @@
       </p:grpSpPr>
       <p:sp>
         <p:nvSpPr>
-          <p:cNvPr id="2" name="Rectangle 1">
-            <a:extLst>
-              <a:ext uri="{FF2B5EF4-FFF2-40B4-BE49-F238E27FC236}">
-                <a16:creationId xmlns:a16="http://schemas.microsoft.com/office/drawing/2014/main" id="{B36411D9-9EAC-E44B-9398-B4930D98AA9E}"/>
-              </a:ext>
-            </a:extLst>
-          </p:cNvPr>
-          <p:cNvSpPr/>
-          <p:nvPr/>
-        </p:nvSpPr>
-        <p:spPr>
-          <a:xfrm>
-            <a:off x="79513" y="87464"/>
-            <a:ext cx="9064487" cy="4858247"/>
-          </a:xfrm>
-          <a:prstGeom prst="rect">
-            <a:avLst/>
-          </a:prstGeom>
-          <a:solidFill>
-            <a:schemeClr val="bg1"/>
-          </a:solidFill>
-        </p:spPr>
-        <p:style>
-          <a:lnRef idx="1">
-            <a:schemeClr val="accent1"/>
-          </a:lnRef>
-          <a:fillRef idx="3">
-            <a:schemeClr val="accent1"/>
-          </a:fillRef>
-          <a:effectRef idx="2">
-            <a:schemeClr val="accent1"/>
-          </a:effectRef>
-          <a:fontRef idx="minor">
-            <a:schemeClr val="lt1"/>
-          </a:fontRef>
-        </p:style>
-        <p:txBody>
-          <a:bodyPr rtlCol="0" anchor="ctr"/>
-          <a:lstStyle/>
-          <a:p>
-            <a:pPr algn="ctr"/>
-            <a:endParaRPr lang="en-US"/>
-          </a:p>
-        </p:txBody>
-      </p:sp>
-      <p:sp>
-        <p:nvSpPr>
-          <p:cNvPr id="15361" name="Title 1">
-            <a:extLst>
-              <a:ext uri="{FF2B5EF4-FFF2-40B4-BE49-F238E27FC236}">
-                <a16:creationId xmlns:a16="http://schemas.microsoft.com/office/drawing/2014/main" id="{9BD03358-C736-4C1A-8E91-843C37ADF1DB}"/>
+          <p:cNvPr id="2" name="Title 1">
+            <a:extLst>
+              <a:ext uri="{FF2B5EF4-FFF2-40B4-BE49-F238E27FC236}">
+                <a16:creationId xmlns:a16="http://schemas.microsoft.com/office/drawing/2014/main" id="{2E8F3070-D222-4F0C-A3E1-AE18044E54EB}"/>
               </a:ext>
             </a:extLst>
           </p:cNvPr>
@@ -6627,8 +6674,8 @@
         </p:nvSpPr>
         <p:spPr>
           <a:xfrm>
-            <a:off x="605696" y="0"/>
-            <a:ext cx="8229600" cy="550926"/>
+            <a:off x="613647" y="152609"/>
+            <a:ext cx="8229600" cy="782327"/>
           </a:xfrm>
         </p:spPr>
         <p:txBody>
@@ -6636,30 +6683,26 @@
           <a:lstStyle/>
           <a:p>
             <a:r>
+              <a:rPr lang="en-US" sz="2000" dirty="0"/>
+              <a:t>EOB Profiles</a:t>
+            </a:r>
+            <a:br>
               <a:rPr lang="en-US" sz="1800" dirty="0"/>
-              <a:t> EOB| </a:t>
-            </a:r>
-            <a:r>
-              <a:rPr lang="en-US" sz="1100" dirty="0"/>
-              <a:t>Profiles align with claims submission standards adopted by the Department of Health and Human  Services. </a:t>
-            </a:r>
-            <a:br>
-              <a:rPr lang="en-US" sz="1200" dirty="0"/>
             </a:br>
             <a:r>
-              <a:rPr lang="en-US" sz="1100" dirty="0"/>
-              <a:t>The result is multiple EOB Profiles:</a:t>
-            </a:r>
-            <a:endParaRPr lang="en-US" altLang="en-US" sz="1800" dirty="0"/>
+              <a:rPr lang="en-US" sz="1600" dirty="0"/>
+              <a:t>Aligned with Dept of Health &amp; Human Services Claim Submission Standards</a:t>
+            </a:r>
+            <a:endParaRPr lang="en-US" sz="1800" dirty="0"/>
           </a:p>
         </p:txBody>
       </p:sp>
       <p:sp>
         <p:nvSpPr>
-          <p:cNvPr id="15363" name="Footer Placeholder 3">
-            <a:extLst>
-              <a:ext uri="{FF2B5EF4-FFF2-40B4-BE49-F238E27FC236}">
-                <a16:creationId xmlns:a16="http://schemas.microsoft.com/office/drawing/2014/main" id="{62AFA8FB-2E5A-4324-ADD7-1326236DA958}"/>
+          <p:cNvPr id="4" name="Footer Placeholder 3">
+            <a:extLst>
+              <a:ext uri="{FF2B5EF4-FFF2-40B4-BE49-F238E27FC236}">
+                <a16:creationId xmlns:a16="http://schemas.microsoft.com/office/drawing/2014/main" id="{91F5F4C4-DAAB-4491-B5A3-648A42315D94}"/>
               </a:ext>
             </a:extLst>
           </p:cNvPr>
@@ -6670,135 +6713,61 @@
             <p:ph type="ftr" sz="quarter" idx="10"/>
           </p:nvPr>
         </p:nvSpPr>
-        <p:spPr>
-          <a:xfrm>
-            <a:off x="1824497" y="6754494"/>
-            <a:ext cx="4530725" cy="158750"/>
-          </a:xfrm>
-        </p:spPr>
+        <p:spPr/>
         <p:txBody>
           <a:bodyPr/>
-          <a:lstStyle>
-            <a:lvl1pPr>
-              <a:defRPr>
-                <a:solidFill>
-                  <a:schemeClr val="tx1"/>
-                </a:solidFill>
-                <a:latin typeface="Arial" panose="020B0604020202020204" pitchFamily="34" charset="0"/>
-                <a:ea typeface="ヒラギノ角ゴ Pro W3" pitchFamily="-126" charset="-128"/>
-              </a:defRPr>
-            </a:lvl1pPr>
-            <a:lvl2pPr marL="742950" indent="-285750">
-              <a:defRPr>
-                <a:solidFill>
-                  <a:schemeClr val="tx1"/>
-                </a:solidFill>
-                <a:latin typeface="Arial" panose="020B0604020202020204" pitchFamily="34" charset="0"/>
-                <a:ea typeface="ヒラギノ角ゴ Pro W3" pitchFamily="-126" charset="-128"/>
-              </a:defRPr>
-            </a:lvl2pPr>
-            <a:lvl3pPr marL="1143000" indent="-228600">
-              <a:defRPr>
-                <a:solidFill>
-                  <a:schemeClr val="tx1"/>
-                </a:solidFill>
-                <a:latin typeface="Arial" panose="020B0604020202020204" pitchFamily="34" charset="0"/>
-                <a:ea typeface="ヒラギノ角ゴ Pro W3" pitchFamily="-126" charset="-128"/>
-              </a:defRPr>
-            </a:lvl3pPr>
-            <a:lvl4pPr marL="1600200" indent="-228600">
-              <a:defRPr>
-                <a:solidFill>
-                  <a:schemeClr val="tx1"/>
-                </a:solidFill>
-                <a:latin typeface="Arial" panose="020B0604020202020204" pitchFamily="34" charset="0"/>
-                <a:ea typeface="ヒラギノ角ゴ Pro W3" pitchFamily="-126" charset="-128"/>
-              </a:defRPr>
-            </a:lvl4pPr>
-            <a:lvl5pPr marL="2057400" indent="-228600">
-              <a:defRPr>
-                <a:solidFill>
-                  <a:schemeClr val="tx1"/>
-                </a:solidFill>
-                <a:latin typeface="Arial" panose="020B0604020202020204" pitchFamily="34" charset="0"/>
-                <a:ea typeface="ヒラギノ角ゴ Pro W3" pitchFamily="-126" charset="-128"/>
-              </a:defRPr>
-            </a:lvl5pPr>
-            <a:lvl6pPr marL="2514600" indent="-228600" defTabSz="457200" fontAlgn="base">
-              <a:spcBef>
-                <a:spcPct val="0"/>
-              </a:spcBef>
-              <a:spcAft>
-                <a:spcPct val="0"/>
-              </a:spcAft>
-              <a:defRPr>
-                <a:solidFill>
-                  <a:schemeClr val="tx1"/>
-                </a:solidFill>
-                <a:latin typeface="Arial" panose="020B0604020202020204" pitchFamily="34" charset="0"/>
-                <a:ea typeface="ヒラギノ角ゴ Pro W3" pitchFamily="-126" charset="-128"/>
-              </a:defRPr>
-            </a:lvl6pPr>
-            <a:lvl7pPr marL="2971800" indent="-228600" defTabSz="457200" fontAlgn="base">
-              <a:spcBef>
-                <a:spcPct val="0"/>
-              </a:spcBef>
-              <a:spcAft>
-                <a:spcPct val="0"/>
-              </a:spcAft>
-              <a:defRPr>
-                <a:solidFill>
-                  <a:schemeClr val="tx1"/>
-                </a:solidFill>
-                <a:latin typeface="Arial" panose="020B0604020202020204" pitchFamily="34" charset="0"/>
-                <a:ea typeface="ヒラギノ角ゴ Pro W3" pitchFamily="-126" charset="-128"/>
-              </a:defRPr>
-            </a:lvl7pPr>
-            <a:lvl8pPr marL="3429000" indent="-228600" defTabSz="457200" fontAlgn="base">
-              <a:spcBef>
-                <a:spcPct val="0"/>
-              </a:spcBef>
-              <a:spcAft>
-                <a:spcPct val="0"/>
-              </a:spcAft>
-              <a:defRPr>
-                <a:solidFill>
-                  <a:schemeClr val="tx1"/>
-                </a:solidFill>
-                <a:latin typeface="Arial" panose="020B0604020202020204" pitchFamily="34" charset="0"/>
-                <a:ea typeface="ヒラギノ角ゴ Pro W3" pitchFamily="-126" charset="-128"/>
-              </a:defRPr>
-            </a:lvl8pPr>
-            <a:lvl9pPr marL="3886200" indent="-228600" defTabSz="457200" fontAlgn="base">
-              <a:spcBef>
-                <a:spcPct val="0"/>
-              </a:spcBef>
-              <a:spcAft>
-                <a:spcPct val="0"/>
-              </a:spcAft>
-              <a:defRPr>
-                <a:solidFill>
-                  <a:schemeClr val="tx1"/>
-                </a:solidFill>
-                <a:latin typeface="Arial" panose="020B0604020202020204" pitchFamily="34" charset="0"/>
-                <a:ea typeface="ヒラギノ角ゴ Pro W3" pitchFamily="-126" charset="-128"/>
-              </a:defRPr>
-            </a:lvl9pPr>
-          </a:lstStyle>
-          <a:p>
-            <a:r>
-              <a:rPr lang="en-US" altLang="en-US" dirty="0"/>
-              <a:t>© 2019 Health Level Seven ® International. Licensed under Creative Commons Attribution 4.0 International HL7, Health Level Seven, FHIR and the FHIR flame logo are registered trademarks of Health Level Seven International. Reg. U.S. TM Office.</a:t>
-            </a:r>
+          <a:lstStyle/>
+          <a:p>
+            <a:r>
+              <a:rPr lang="en-US" b="1"/>
+              <a:t>© 2019 Health Level Seven ® International. Licensed under Creative Commons Attribution 4.0 International</a:t>
+            </a:r>
+          </a:p>
+          <a:p>
+            <a:r>
+              <a:rPr lang="en-US" b="1"/>
+              <a:t>HL7, Health Level Seven, FHIR and the FHIR flame logo are registered trademarks of Health Level Seven International. Reg. U.S. TM Office.</a:t>
+            </a:r>
+            <a:endParaRPr lang="en-US" b="1" dirty="0"/>
+          </a:p>
+        </p:txBody>
+      </p:sp>
+      <p:sp>
+        <p:nvSpPr>
+          <p:cNvPr id="5" name="Slide Number Placeholder 4">
+            <a:extLst>
+              <a:ext uri="{FF2B5EF4-FFF2-40B4-BE49-F238E27FC236}">
+                <a16:creationId xmlns:a16="http://schemas.microsoft.com/office/drawing/2014/main" id="{7AFC7D0C-6DC5-4BA2-A40E-99114BD8FE90}"/>
+              </a:ext>
+            </a:extLst>
+          </p:cNvPr>
+          <p:cNvSpPr>
+            <a:spLocks noGrp="1"/>
+          </p:cNvSpPr>
+          <p:nvPr>
+            <p:ph type="sldNum" sz="quarter" idx="11"/>
+          </p:nvPr>
+        </p:nvSpPr>
+        <p:spPr/>
+        <p:txBody>
+          <a:bodyPr/>
+          <a:lstStyle/>
+          <a:p>
+            <a:fld id="{6CACE926-AEF5-4BFE-8BD7-24414108CB7B}" type="slidenum">
+              <a:rPr lang="en-US" altLang="en-US" smtClean="0"/>
+              <a:pPr/>
+              <a:t>1</a:t>
+            </a:fld>
+            <a:endParaRPr lang="en-US" altLang="en-US" dirty="0"/>
           </a:p>
         </p:txBody>
       </p:sp>
       <p:pic>
         <p:nvPicPr>
-          <p:cNvPr id="15" name="Picture 14">
-            <a:extLst>
-              <a:ext uri="{FF2B5EF4-FFF2-40B4-BE49-F238E27FC236}">
-                <a16:creationId xmlns:a16="http://schemas.microsoft.com/office/drawing/2014/main" id="{C76B1A78-1F06-4B92-ACAA-74C310CA397A}"/>
+          <p:cNvPr id="19" name="Picture 18">
+            <a:extLst>
+              <a:ext uri="{FF2B5EF4-FFF2-40B4-BE49-F238E27FC236}">
+                <a16:creationId xmlns:a16="http://schemas.microsoft.com/office/drawing/2014/main" id="{00252843-9AFC-4112-B9F4-6A333DEE448B}"/>
               </a:ext>
             </a:extLst>
           </p:cNvPr>
@@ -6815,8 +6784,8 @@
         </p:blipFill>
         <p:spPr>
           <a:xfrm>
-            <a:off x="536943" y="4389126"/>
-            <a:ext cx="8200657" cy="269540"/>
+            <a:off x="719755" y="786245"/>
+            <a:ext cx="7704490" cy="3688235"/>
           </a:xfrm>
           <a:prstGeom prst="rect">
             <a:avLst/>
@@ -6825,21 +6794,28 @@
       </p:pic>
       <p:pic>
         <p:nvPicPr>
-          <p:cNvPr id="4" name="Picture 3"/>
+          <p:cNvPr id="21" name="Picture 20">
+            <a:extLst>
+              <a:ext uri="{FF2B5EF4-FFF2-40B4-BE49-F238E27FC236}">
+                <a16:creationId xmlns:a16="http://schemas.microsoft.com/office/drawing/2014/main" id="{A636189A-9723-4E85-8006-F1B0838CEB9B}"/>
+              </a:ext>
+            </a:extLst>
+          </p:cNvPr>
           <p:cNvPicPr>
             <a:picLocks noChangeAspect="1"/>
           </p:cNvPicPr>
           <p:nvPr/>
         </p:nvPicPr>
-        <p:blipFill rotWithShape="1">
+        <p:blipFill>
           <a:blip r:embed="rId3"/>
-          <a:srcRect l="20208" t="21914" r="13194" b="23766"/>
-          <a:stretch/>
+          <a:stretch>
+            <a:fillRect/>
+          </a:stretch>
         </p:blipFill>
         <p:spPr>
           <a:xfrm>
-            <a:off x="536943" y="749427"/>
-            <a:ext cx="8200657" cy="3639699"/>
+            <a:off x="719755" y="4404941"/>
+            <a:ext cx="7704490" cy="262517"/>
           </a:xfrm>
           <a:prstGeom prst="rect">
             <a:avLst/>
@@ -6849,7 +6825,7 @@
     </p:spTree>
     <p:extLst>
       <p:ext uri="{BB962C8B-B14F-4D97-AF65-F5344CB8AC3E}">
-        <p14:creationId xmlns:p14="http://schemas.microsoft.com/office/powerpoint/2010/main" val="3680189892"/>
+        <p14:creationId xmlns:p14="http://schemas.microsoft.com/office/powerpoint/2010/main" val="2421107156"/>
       </p:ext>
     </p:extLst>
   </p:cSld>
@@ -7815,4 +7791,286 @@
   </a:objectDefaults>
   <a:extraClrSchemeLst/>
 </a:theme>
+</file>
+
+<file path=customXml/item1.xml><?xml version="1.0" encoding="utf-8"?>
+<ct:contentTypeSchema xmlns:ct="http://schemas.microsoft.com/office/2006/metadata/contentType" xmlns:ma="http://schemas.microsoft.com/office/2006/metadata/properties/metaAttributes" ct:_="" ma:_="" ma:contentTypeName="Document" ma:contentTypeID="0x0101003D0C67F1D0418E4D8CEA030F6226C240" ma:contentTypeVersion="13" ma:contentTypeDescription="Create a new document." ma:contentTypeScope="" ma:versionID="eacabd6a26b552791a79207640423285">
+  <xsd:schema xmlns:xsd="http://www.w3.org/2001/XMLSchema" xmlns:xs="http://www.w3.org/2001/XMLSchema" xmlns:p="http://schemas.microsoft.com/office/2006/metadata/properties" xmlns:ns3="fd039111-a3d4-483d-82af-7ea19c5c1cff" xmlns:ns4="3441a4ca-e6b7-4eb7-9d37-d8bac3973302" targetNamespace="http://schemas.microsoft.com/office/2006/metadata/properties" ma:root="true" ma:fieldsID="142e8a5a503bd8014b1ea416b9465201" ns3:_="" ns4:_="">
+    <xsd:import namespace="fd039111-a3d4-483d-82af-7ea19c5c1cff"/>
+    <xsd:import namespace="3441a4ca-e6b7-4eb7-9d37-d8bac3973302"/>
+    <xsd:element name="properties">
+      <xsd:complexType>
+        <xsd:sequence>
+          <xsd:element name="documentManagement">
+            <xsd:complexType>
+              <xsd:all>
+                <xsd:element ref="ns3:MediaServiceMetadata" minOccurs="0"/>
+                <xsd:element ref="ns3:MediaServiceFastMetadata" minOccurs="0"/>
+                <xsd:element ref="ns3:MediaServiceAutoTags" minOccurs="0"/>
+                <xsd:element ref="ns3:MediaServiceGenerationTime" minOccurs="0"/>
+                <xsd:element ref="ns3:MediaServiceEventHashCode" minOccurs="0"/>
+                <xsd:element ref="ns3:MediaServiceOCR" minOccurs="0"/>
+                <xsd:element ref="ns3:MediaServiceDateTaken" minOccurs="0"/>
+                <xsd:element ref="ns3:MediaServiceAutoKeyPoints" minOccurs="0"/>
+                <xsd:element ref="ns3:MediaServiceKeyPoints" minOccurs="0"/>
+                <xsd:element ref="ns3:MediaServiceLocation" minOccurs="0"/>
+                <xsd:element ref="ns4:SharedWithUsers" minOccurs="0"/>
+                <xsd:element ref="ns4:SharedWithDetails" minOccurs="0"/>
+                <xsd:element ref="ns4:SharingHintHash" minOccurs="0"/>
+              </xsd:all>
+            </xsd:complexType>
+          </xsd:element>
+        </xsd:sequence>
+      </xsd:complexType>
+    </xsd:element>
+  </xsd:schema>
+  <xsd:schema xmlns:xsd="http://www.w3.org/2001/XMLSchema" xmlns:xs="http://www.w3.org/2001/XMLSchema" xmlns:dms="http://schemas.microsoft.com/office/2006/documentManagement/types" xmlns:pc="http://schemas.microsoft.com/office/infopath/2007/PartnerControls" targetNamespace="fd039111-a3d4-483d-82af-7ea19c5c1cff" elementFormDefault="qualified">
+    <xsd:import namespace="http://schemas.microsoft.com/office/2006/documentManagement/types"/>
+    <xsd:import namespace="http://schemas.microsoft.com/office/infopath/2007/PartnerControls"/>
+    <xsd:element name="MediaServiceMetadata" ma:index="8" nillable="true" ma:displayName="MediaServiceMetadata" ma:description="" ma:hidden="true" ma:internalName="MediaServiceMetadata" ma:readOnly="true">
+      <xsd:simpleType>
+        <xsd:restriction base="dms:Note"/>
+      </xsd:simpleType>
+    </xsd:element>
+    <xsd:element name="MediaServiceFastMetadata" ma:index="9" nillable="true" ma:displayName="MediaServiceFastMetadata" ma:description="" ma:hidden="true" ma:internalName="MediaServiceFastMetadata" ma:readOnly="true">
+      <xsd:simpleType>
+        <xsd:restriction base="dms:Note"/>
+      </xsd:simpleType>
+    </xsd:element>
+    <xsd:element name="MediaServiceAutoTags" ma:index="10" nillable="true" ma:displayName="Tags" ma:internalName="MediaServiceAutoTags" ma:readOnly="true">
+      <xsd:simpleType>
+        <xsd:restriction base="dms:Text"/>
+      </xsd:simpleType>
+    </xsd:element>
+    <xsd:element name="MediaServiceGenerationTime" ma:index="11" nillable="true" ma:displayName="MediaServiceGenerationTime" ma:hidden="true" ma:internalName="MediaServiceGenerationTime" ma:readOnly="true">
+      <xsd:simpleType>
+        <xsd:restriction base="dms:Text"/>
+      </xsd:simpleType>
+    </xsd:element>
+    <xsd:element name="MediaServiceEventHashCode" ma:index="12" nillable="true" ma:displayName="MediaServiceEventHashCode" ma:hidden="true" ma:internalName="MediaServiceEventHashCode" ma:readOnly="true">
+      <xsd:simpleType>
+        <xsd:restriction base="dms:Text"/>
+      </xsd:simpleType>
+    </xsd:element>
+    <xsd:element name="MediaServiceOCR" ma:index="13" nillable="true" ma:displayName="Extracted Text" ma:internalName="MediaServiceOCR" ma:readOnly="true">
+      <xsd:simpleType>
+        <xsd:restriction base="dms:Note">
+          <xsd:maxLength value="255"/>
+        </xsd:restriction>
+      </xsd:simpleType>
+    </xsd:element>
+    <xsd:element name="MediaServiceDateTaken" ma:index="14" nillable="true" ma:displayName="MediaServiceDateTaken" ma:hidden="true" ma:internalName="MediaServiceDateTaken" ma:readOnly="true">
+      <xsd:simpleType>
+        <xsd:restriction base="dms:Text"/>
+      </xsd:simpleType>
+    </xsd:element>
+    <xsd:element name="MediaServiceAutoKeyPoints" ma:index="15" nillable="true" ma:displayName="MediaServiceAutoKeyPoints" ma:hidden="true" ma:internalName="MediaServiceAutoKeyPoints" ma:readOnly="true">
+      <xsd:simpleType>
+        <xsd:restriction base="dms:Note"/>
+      </xsd:simpleType>
+    </xsd:element>
+    <xsd:element name="MediaServiceKeyPoints" ma:index="16" nillable="true" ma:displayName="KeyPoints" ma:internalName="MediaServiceKeyPoints" ma:readOnly="true">
+      <xsd:simpleType>
+        <xsd:restriction base="dms:Note">
+          <xsd:maxLength value="255"/>
+        </xsd:restriction>
+      </xsd:simpleType>
+    </xsd:element>
+    <xsd:element name="MediaServiceLocation" ma:index="17" nillable="true" ma:displayName="Location" ma:internalName="MediaServiceLocation" ma:readOnly="true">
+      <xsd:simpleType>
+        <xsd:restriction base="dms:Text"/>
+      </xsd:simpleType>
+    </xsd:element>
+  </xsd:schema>
+  <xsd:schema xmlns:xsd="http://www.w3.org/2001/XMLSchema" xmlns:xs="http://www.w3.org/2001/XMLSchema" xmlns:dms="http://schemas.microsoft.com/office/2006/documentManagement/types" xmlns:pc="http://schemas.microsoft.com/office/infopath/2007/PartnerControls" targetNamespace="3441a4ca-e6b7-4eb7-9d37-d8bac3973302" elementFormDefault="qualified">
+    <xsd:import namespace="http://schemas.microsoft.com/office/2006/documentManagement/types"/>
+    <xsd:import namespace="http://schemas.microsoft.com/office/infopath/2007/PartnerControls"/>
+    <xsd:element name="SharedWithUsers" ma:index="18" nillable="true" ma:displayName="Shared With" ma:internalName="SharedWithUsers" ma:readOnly="true">
+      <xsd:complexType>
+        <xsd:complexContent>
+          <xsd:extension base="dms:UserMulti">
+            <xsd:sequence>
+              <xsd:element name="UserInfo" minOccurs="0" maxOccurs="unbounded">
+                <xsd:complexType>
+                  <xsd:sequence>
+                    <xsd:element name="DisplayName" type="xsd:string" minOccurs="0"/>
+                    <xsd:element name="AccountId" type="dms:UserId" minOccurs="0" nillable="true"/>
+                    <xsd:element name="AccountType" type="xsd:string" minOccurs="0"/>
+                  </xsd:sequence>
+                </xsd:complexType>
+              </xsd:element>
+            </xsd:sequence>
+          </xsd:extension>
+        </xsd:complexContent>
+      </xsd:complexType>
+    </xsd:element>
+    <xsd:element name="SharedWithDetails" ma:index="19" nillable="true" ma:displayName="Shared With Details" ma:internalName="SharedWithDetails" ma:readOnly="true">
+      <xsd:simpleType>
+        <xsd:restriction base="dms:Note">
+          <xsd:maxLength value="255"/>
+        </xsd:restriction>
+      </xsd:simpleType>
+    </xsd:element>
+    <xsd:element name="SharingHintHash" ma:index="20" nillable="true" ma:displayName="Sharing Hint Hash" ma:hidden="true" ma:internalName="SharingHintHash" ma:readOnly="true">
+      <xsd:simpleType>
+        <xsd:restriction base="dms:Text"/>
+      </xsd:simpleType>
+    </xsd:element>
+  </xsd:schema>
+  <xsd:schema xmlns="http://schemas.openxmlformats.org/package/2006/metadata/core-properties" xmlns:xsd="http://www.w3.org/2001/XMLSchema" xmlns:xsi="http://www.w3.org/2001/XMLSchema-instance" xmlns:dc="http://purl.org/dc/elements/1.1/" xmlns:dcterms="http://purl.org/dc/terms/" xmlns:odoc="http://schemas.microsoft.com/internal/obd" targetNamespace="http://schemas.openxmlformats.org/package/2006/metadata/core-properties" elementFormDefault="qualified" attributeFormDefault="unqualified" blockDefault="#all">
+    <xsd:import namespace="http://purl.org/dc/elements/1.1/" schemaLocation="http://dublincore.org/schemas/xmls/qdc/2003/04/02/dc.xsd"/>
+    <xsd:import namespace="http://purl.org/dc/terms/" schemaLocation="http://dublincore.org/schemas/xmls/qdc/2003/04/02/dcterms.xsd"/>
+    <xsd:element name="coreProperties" type="CT_coreProperties"/>
+    <xsd:complexType name="CT_coreProperties">
+      <xsd:all>
+        <xsd:element ref="dc:creator" minOccurs="0" maxOccurs="1"/>
+        <xsd:element ref="dcterms:created" minOccurs="0" maxOccurs="1"/>
+        <xsd:element ref="dc:identifier" minOccurs="0" maxOccurs="1"/>
+        <xsd:element name="contentType" minOccurs="0" maxOccurs="1" type="xsd:string" ma:index="0" ma:displayName="Content Type"/>
+        <xsd:element ref="dc:title" minOccurs="0" maxOccurs="1" ma:index="4" ma:displayName="Title"/>
+        <xsd:element ref="dc:subject" minOccurs="0" maxOccurs="1"/>
+        <xsd:element ref="dc:description" minOccurs="0" maxOccurs="1"/>
+        <xsd:element name="keywords" minOccurs="0" maxOccurs="1" type="xsd:string"/>
+        <xsd:element ref="dc:language" minOccurs="0" maxOccurs="1"/>
+        <xsd:element name="category" minOccurs="0" maxOccurs="1" type="xsd:string"/>
+        <xsd:element name="version" minOccurs="0" maxOccurs="1" type="xsd:string"/>
+        <xsd:element name="revision" minOccurs="0" maxOccurs="1" type="xsd:string">
+          <xsd:annotation>
+            <xsd:documentation>
+                        This value indicates the number of saves or revisions. The application is responsible for updating this value after each revision.
+                    </xsd:documentation>
+          </xsd:annotation>
+        </xsd:element>
+        <xsd:element name="lastModifiedBy" minOccurs="0" maxOccurs="1" type="xsd:string"/>
+        <xsd:element ref="dcterms:modified" minOccurs="0" maxOccurs="1"/>
+        <xsd:element name="contentStatus" minOccurs="0" maxOccurs="1" type="xsd:string"/>
+      </xsd:all>
+    </xsd:complexType>
+  </xsd:schema>
+  <xs:schema xmlns:pc="http://schemas.microsoft.com/office/infopath/2007/PartnerControls" xmlns:xs="http://www.w3.org/2001/XMLSchema" targetNamespace="http://schemas.microsoft.com/office/infopath/2007/PartnerControls" elementFormDefault="qualified" attributeFormDefault="unqualified">
+    <xs:element name="Person">
+      <xs:complexType>
+        <xs:sequence>
+          <xs:element ref="pc:DisplayName" minOccurs="0"/>
+          <xs:element ref="pc:AccountId" minOccurs="0"/>
+          <xs:element ref="pc:AccountType" minOccurs="0"/>
+        </xs:sequence>
+      </xs:complexType>
+    </xs:element>
+    <xs:element name="DisplayName" type="xs:string"/>
+    <xs:element name="AccountId" type="xs:string"/>
+    <xs:element name="AccountType" type="xs:string"/>
+    <xs:element name="BDCAssociatedEntity">
+      <xs:complexType>
+        <xs:sequence>
+          <xs:element ref="pc:BDCEntity" minOccurs="0" maxOccurs="unbounded"/>
+        </xs:sequence>
+        <xs:attribute ref="pc:EntityNamespace"/>
+        <xs:attribute ref="pc:EntityName"/>
+        <xs:attribute ref="pc:SystemInstanceName"/>
+        <xs:attribute ref="pc:AssociationName"/>
+      </xs:complexType>
+    </xs:element>
+    <xs:attribute name="EntityNamespace" type="xs:string"/>
+    <xs:attribute name="EntityName" type="xs:string"/>
+    <xs:attribute name="SystemInstanceName" type="xs:string"/>
+    <xs:attribute name="AssociationName" type="xs:string"/>
+    <xs:element name="BDCEntity">
+      <xs:complexType>
+        <xs:sequence>
+          <xs:element ref="pc:EntityDisplayName" minOccurs="0"/>
+          <xs:element ref="pc:EntityInstanceReference" minOccurs="0"/>
+          <xs:element ref="pc:EntityId1" minOccurs="0"/>
+          <xs:element ref="pc:EntityId2" minOccurs="0"/>
+          <xs:element ref="pc:EntityId3" minOccurs="0"/>
+          <xs:element ref="pc:EntityId4" minOccurs="0"/>
+          <xs:element ref="pc:EntityId5" minOccurs="0"/>
+        </xs:sequence>
+      </xs:complexType>
+    </xs:element>
+    <xs:element name="EntityDisplayName" type="xs:string"/>
+    <xs:element name="EntityInstanceReference" type="xs:string"/>
+    <xs:element name="EntityId1" type="xs:string"/>
+    <xs:element name="EntityId2" type="xs:string"/>
+    <xs:element name="EntityId3" type="xs:string"/>
+    <xs:element name="EntityId4" type="xs:string"/>
+    <xs:element name="EntityId5" type="xs:string"/>
+    <xs:element name="Terms">
+      <xs:complexType>
+        <xs:sequence>
+          <xs:element ref="pc:TermInfo" minOccurs="0" maxOccurs="unbounded"/>
+        </xs:sequence>
+      </xs:complexType>
+    </xs:element>
+    <xs:element name="TermInfo">
+      <xs:complexType>
+        <xs:sequence>
+          <xs:element ref="pc:TermName" minOccurs="0"/>
+          <xs:element ref="pc:TermId" minOccurs="0"/>
+        </xs:sequence>
+      </xs:complexType>
+    </xs:element>
+    <xs:element name="TermName" type="xs:string"/>
+    <xs:element name="TermId" type="xs:string"/>
+  </xs:schema>
+</ct:contentTypeSchema>
+</file>
+
+<file path=customXml/item2.xml><?xml version="1.0" encoding="utf-8"?>
+<?mso-contentType ?>
+<FormTemplates xmlns="http://schemas.microsoft.com/sharepoint/v3/contenttype/forms">
+  <Display>DocumentLibraryForm</Display>
+  <Edit>DocumentLibraryForm</Edit>
+  <New>DocumentLibraryForm</New>
+</FormTemplates>
+</file>
+
+<file path=customXml/item3.xml><?xml version="1.0" encoding="utf-8"?>
+<p:properties xmlns:p="http://schemas.microsoft.com/office/2006/metadata/properties" xmlns:xsi="http://www.w3.org/2001/XMLSchema-instance" xmlns:pc="http://schemas.microsoft.com/office/infopath/2007/PartnerControls">
+  <documentManagement/>
+</p:properties>
+</file>
+
+<file path=customXml/itemProps1.xml><?xml version="1.0" encoding="utf-8"?>
+<ds:datastoreItem xmlns:ds="http://schemas.openxmlformats.org/officeDocument/2006/customXml" ds:itemID="{B86E1474-AF3A-489C-A2A1-0B17F3BDDAF7}">
+  <ds:schemaRefs>
+    <ds:schemaRef ds:uri="http://schemas.microsoft.com/office/2006/metadata/contentType"/>
+    <ds:schemaRef ds:uri="http://schemas.microsoft.com/office/2006/metadata/properties/metaAttributes"/>
+    <ds:schemaRef ds:uri="http://www.w3.org/2001/XMLSchema"/>
+    <ds:schemaRef ds:uri="http://schemas.microsoft.com/office/2006/metadata/properties"/>
+    <ds:schemaRef ds:uri="fd039111-a3d4-483d-82af-7ea19c5c1cff"/>
+    <ds:schemaRef ds:uri="3441a4ca-e6b7-4eb7-9d37-d8bac3973302"/>
+    <ds:schemaRef ds:uri="http://schemas.microsoft.com/office/2006/documentManagement/types"/>
+    <ds:schemaRef ds:uri="http://schemas.microsoft.com/office/infopath/2007/PartnerControls"/>
+    <ds:schemaRef ds:uri="http://schemas.openxmlformats.org/package/2006/metadata/core-properties"/>
+    <ds:schemaRef ds:uri="http://purl.org/dc/elements/1.1/"/>
+    <ds:schemaRef ds:uri="http://purl.org/dc/terms/"/>
+    <ds:schemaRef ds:uri="http://schemas.microsoft.com/internal/obd"/>
+  </ds:schemaRefs>
+</ds:datastoreItem>
+</file>
+
+<file path=customXml/itemProps2.xml><?xml version="1.0" encoding="utf-8"?>
+<ds:datastoreItem xmlns:ds="http://schemas.openxmlformats.org/officeDocument/2006/customXml" ds:itemID="{A21C8A99-0B06-4475-AE99-A1F9C0A19373}">
+  <ds:schemaRefs>
+    <ds:schemaRef ds:uri="http://schemas.microsoft.com/sharepoint/v3/contenttype/forms"/>
+  </ds:schemaRefs>
+</ds:datastoreItem>
+</file>
+
+<file path=customXml/itemProps3.xml><?xml version="1.0" encoding="utf-8"?>
+<ds:datastoreItem xmlns:ds="http://schemas.openxmlformats.org/officeDocument/2006/customXml" ds:itemID="{1A8B9704-4E07-47B0-BC95-BAEDDA36711F}">
+  <ds:schemaRefs>
+    <ds:schemaRef ds:uri="http://purl.org/dc/terms/"/>
+    <ds:schemaRef ds:uri="http://purl.org/dc/dcmitype/"/>
+    <ds:schemaRef ds:uri="http://schemas.microsoft.com/office/infopath/2007/PartnerControls"/>
+    <ds:schemaRef ds:uri="http://schemas.microsoft.com/office/2006/documentManagement/types"/>
+    <ds:schemaRef ds:uri="3441a4ca-e6b7-4eb7-9d37-d8bac3973302"/>
+    <ds:schemaRef ds:uri="http://schemas.microsoft.com/office/2006/metadata/properties"/>
+    <ds:schemaRef ds:uri="http://purl.org/dc/elements/1.1/"/>
+    <ds:schemaRef ds:uri="fd039111-a3d4-483d-82af-7ea19c5c1cff"/>
+    <ds:schemaRef ds:uri="http://schemas.openxmlformats.org/package/2006/metadata/core-properties"/>
+    <ds:schemaRef ds:uri="http://www.w3.org/XML/1998/namespace"/>
+  </ds:schemaRefs>
+</ds:datastoreItem>
 </file>
</xml_diff>